<commit_message>
modeling/CD/intermediate: update question, add answer
</commit_message>
<xml_diff>
--- a/diagrams/uml/classDiagrams/introduction/what/classDiagramExample1.pptx
+++ b/diagrams/uml/classDiagrams/introduction/what/classDiagramExample1.pptx
@@ -304,7 +304,7 @@
           <a:p>
             <a:fld id="{A0F86979-30DA-49EE-A740-32EBA6D2B7DE}" type="datetimeFigureOut">
               <a:rPr lang="en-SG" smtClean="0"/>
-              <a:t>30/8/2017</a:t>
+              <a:t>17/9/2018</a:t>
             </a:fld>
             <a:endParaRPr lang="en-SG"/>
           </a:p>
@@ -474,7 +474,7 @@
           <a:p>
             <a:fld id="{A0F86979-30DA-49EE-A740-32EBA6D2B7DE}" type="datetimeFigureOut">
               <a:rPr lang="en-SG" smtClean="0"/>
-              <a:t>30/8/2017</a:t>
+              <a:t>17/9/2018</a:t>
             </a:fld>
             <a:endParaRPr lang="en-SG"/>
           </a:p>
@@ -654,7 +654,7 @@
           <a:p>
             <a:fld id="{A0F86979-30DA-49EE-A740-32EBA6D2B7DE}" type="datetimeFigureOut">
               <a:rPr lang="en-SG" smtClean="0"/>
-              <a:t>30/8/2017</a:t>
+              <a:t>17/9/2018</a:t>
             </a:fld>
             <a:endParaRPr lang="en-SG"/>
           </a:p>
@@ -824,7 +824,7 @@
           <a:p>
             <a:fld id="{A0F86979-30DA-49EE-A740-32EBA6D2B7DE}" type="datetimeFigureOut">
               <a:rPr lang="en-SG" smtClean="0"/>
-              <a:t>30/8/2017</a:t>
+              <a:t>17/9/2018</a:t>
             </a:fld>
             <a:endParaRPr lang="en-SG"/>
           </a:p>
@@ -1070,7 +1070,7 @@
           <a:p>
             <a:fld id="{A0F86979-30DA-49EE-A740-32EBA6D2B7DE}" type="datetimeFigureOut">
               <a:rPr lang="en-SG" smtClean="0"/>
-              <a:t>30/8/2017</a:t>
+              <a:t>17/9/2018</a:t>
             </a:fld>
             <a:endParaRPr lang="en-SG"/>
           </a:p>
@@ -1358,7 +1358,7 @@
           <a:p>
             <a:fld id="{A0F86979-30DA-49EE-A740-32EBA6D2B7DE}" type="datetimeFigureOut">
               <a:rPr lang="en-SG" smtClean="0"/>
-              <a:t>30/8/2017</a:t>
+              <a:t>17/9/2018</a:t>
             </a:fld>
             <a:endParaRPr lang="en-SG"/>
           </a:p>
@@ -1780,7 +1780,7 @@
           <a:p>
             <a:fld id="{A0F86979-30DA-49EE-A740-32EBA6D2B7DE}" type="datetimeFigureOut">
               <a:rPr lang="en-SG" smtClean="0"/>
-              <a:t>30/8/2017</a:t>
+              <a:t>17/9/2018</a:t>
             </a:fld>
             <a:endParaRPr lang="en-SG"/>
           </a:p>
@@ -1898,7 +1898,7 @@
           <a:p>
             <a:fld id="{A0F86979-30DA-49EE-A740-32EBA6D2B7DE}" type="datetimeFigureOut">
               <a:rPr lang="en-SG" smtClean="0"/>
-              <a:t>30/8/2017</a:t>
+              <a:t>17/9/2018</a:t>
             </a:fld>
             <a:endParaRPr lang="en-SG"/>
           </a:p>
@@ -1993,7 +1993,7 @@
           <a:p>
             <a:fld id="{A0F86979-30DA-49EE-A740-32EBA6D2B7DE}" type="datetimeFigureOut">
               <a:rPr lang="en-SG" smtClean="0"/>
-              <a:t>30/8/2017</a:t>
+              <a:t>17/9/2018</a:t>
             </a:fld>
             <a:endParaRPr lang="en-SG"/>
           </a:p>
@@ -2270,7 +2270,7 @@
           <a:p>
             <a:fld id="{A0F86979-30DA-49EE-A740-32EBA6D2B7DE}" type="datetimeFigureOut">
               <a:rPr lang="en-SG" smtClean="0"/>
-              <a:t>30/8/2017</a:t>
+              <a:t>17/9/2018</a:t>
             </a:fld>
             <a:endParaRPr lang="en-SG"/>
           </a:p>
@@ -2523,7 +2523,7 @@
           <a:p>
             <a:fld id="{A0F86979-30DA-49EE-A740-32EBA6D2B7DE}" type="datetimeFigureOut">
               <a:rPr lang="en-SG" smtClean="0"/>
-              <a:t>30/8/2017</a:t>
+              <a:t>17/9/2018</a:t>
             </a:fld>
             <a:endParaRPr lang="en-SG"/>
           </a:p>
@@ -2736,7 +2736,7 @@
           <a:p>
             <a:fld id="{A0F86979-30DA-49EE-A740-32EBA6D2B7DE}" type="datetimeFigureOut">
               <a:rPr lang="en-SG" smtClean="0"/>
-              <a:t>30/8/2017</a:t>
+              <a:t>17/9/2018</a:t>
             </a:fld>
             <a:endParaRPr lang="en-SG"/>
           </a:p>
@@ -3119,8 +3119,8 @@
         </p:nvSpPr>
         <p:spPr>
           <a:xfrm>
-            <a:off x="705074" y="5049181"/>
-            <a:ext cx="1384146" cy="540059"/>
+            <a:off x="755576" y="4967412"/>
+            <a:ext cx="1258315" cy="540059"/>
           </a:xfrm>
           <a:prstGeom prst="rect">
             <a:avLst/>
@@ -3215,7 +3215,7 @@
         </p:nvSpPr>
         <p:spPr>
           <a:xfrm>
-            <a:off x="2411760" y="2620566"/>
+            <a:off x="2535744" y="2621051"/>
             <a:ext cx="770958" cy="315007"/>
           </a:xfrm>
           <a:prstGeom prst="rect">
@@ -3302,7 +3302,7 @@
         </p:nvSpPr>
         <p:spPr>
           <a:xfrm flipH="1" flipV="1">
-            <a:off x="1249384" y="4878921"/>
+            <a:off x="1236970" y="4797152"/>
             <a:ext cx="295526" cy="171685"/>
           </a:xfrm>
           <a:prstGeom prst="triangle">
@@ -3345,8 +3345,8 @@
         </p:nvCxnSpPr>
         <p:spPr>
           <a:xfrm rot="5400000" flipH="1" flipV="1">
-            <a:off x="1183997" y="4660493"/>
-            <a:ext cx="431578" cy="5278"/>
+            <a:off x="1218675" y="4613402"/>
+            <a:ext cx="349809" cy="17692"/>
           </a:xfrm>
           <a:prstGeom prst="bentConnector3">
             <a:avLst>
@@ -3385,8 +3385,8 @@
         </p:nvCxnSpPr>
         <p:spPr>
           <a:xfrm>
-            <a:off x="3182718" y="2778070"/>
-            <a:ext cx="1025994" cy="452440"/>
+            <a:off x="3306702" y="2778555"/>
+            <a:ext cx="866498" cy="451955"/>
           </a:xfrm>
           <a:prstGeom prst="bentConnector2">
             <a:avLst/>
@@ -3760,7 +3760,7 @@
         </p:nvSpPr>
         <p:spPr>
           <a:xfrm>
-            <a:off x="3727214" y="3230510"/>
+            <a:off x="3691702" y="3230510"/>
             <a:ext cx="962996" cy="456185"/>
           </a:xfrm>
           <a:prstGeom prst="rect">
@@ -3808,7 +3808,7 @@
         <p:spPr>
           <a:xfrm rot="10800000">
             <a:off x="3248924" y="3458603"/>
-            <a:ext cx="478290" cy="12700"/>
+            <a:ext cx="442778" cy="12700"/>
           </a:xfrm>
           <a:prstGeom prst="bentConnector3">
             <a:avLst>
@@ -3847,8 +3847,8 @@
         </p:nvCxnSpPr>
         <p:spPr>
           <a:xfrm rot="5400000">
-            <a:off x="3861439" y="3996814"/>
-            <a:ext cx="657393" cy="37154"/>
+            <a:off x="3843683" y="4014570"/>
+            <a:ext cx="657393" cy="1642"/>
           </a:xfrm>
           <a:prstGeom prst="bentConnector3">
             <a:avLst>
@@ -3887,8 +3887,8 @@
         </p:nvCxnSpPr>
         <p:spPr>
           <a:xfrm rot="16200000" flipH="1">
-            <a:off x="2690582" y="3042230"/>
-            <a:ext cx="341753" cy="128438"/>
+            <a:off x="2752816" y="3104465"/>
+            <a:ext cx="341268" cy="4454"/>
           </a:xfrm>
           <a:prstGeom prst="bentConnector3">
             <a:avLst>
@@ -4093,8 +4093,8 @@
         </p:nvCxnSpPr>
         <p:spPr>
           <a:xfrm>
-            <a:off x="1672454" y="2778069"/>
-            <a:ext cx="739306" cy="1"/>
+            <a:off x="1672454" y="2778555"/>
+            <a:ext cx="863290" cy="12700"/>
           </a:xfrm>
           <a:prstGeom prst="bentConnector3">
             <a:avLst>
@@ -4103,7 +4103,7 @@
           </a:prstGeom>
           <a:ln w="28575">
             <a:solidFill>
-              <a:schemeClr val="accent4">
+              <a:schemeClr val="accent3">
                 <a:lumMod val="75000"/>
               </a:schemeClr>
             </a:solidFill>
@@ -4145,7 +4145,7 @@
           </a:prstGeom>
           <a:ln w="28575">
             <a:solidFill>
-              <a:schemeClr val="accent4">
+              <a:schemeClr val="accent3">
                 <a:lumMod val="75000"/>
               </a:schemeClr>
             </a:solidFill>
@@ -4178,12 +4178,12 @@
         </p:nvCxnSpPr>
         <p:spPr>
           <a:xfrm rot="16200000" flipH="1">
-            <a:off x="4715053" y="702752"/>
-            <a:ext cx="880442" cy="4716071"/>
+            <a:off x="4777287" y="764986"/>
+            <a:ext cx="879957" cy="4592087"/>
           </a:xfrm>
           <a:prstGeom prst="bentConnector3">
             <a:avLst>
-              <a:gd name="adj1" fmla="val -25964"/>
+              <a:gd name="adj1" fmla="val -25979"/>
             </a:avLst>
           </a:prstGeom>
           <a:ln w="28575">
@@ -4219,7 +4219,7 @@
         <p:spPr>
           <a:xfrm>
             <a:off x="5705107" y="4226319"/>
-            <a:ext cx="985187" cy="310743"/>
+            <a:ext cx="985187" cy="574714"/>
           </a:xfrm>
           <a:prstGeom prst="rect">
             <a:avLst/>
@@ -4244,6 +4244,13 @@
         <p:txBody>
           <a:bodyPr rtlCol="0" anchor="ctr"/>
           <a:lstStyle/>
+          <a:p>
+            <a:pPr algn="ctr"/>
+            <a:r>
+              <a:rPr lang="en-US" sz="1400" dirty="0" smtClean="0"/>
+              <a:t>{abstract}</a:t>
+            </a:r>
+          </a:p>
           <a:p>
             <a:pPr algn="ctr"/>
             <a:r>
@@ -4466,7 +4473,7 @@
         </p:nvSpPr>
         <p:spPr>
           <a:xfrm rot="10800000" flipH="1" flipV="1">
-            <a:off x="6040670" y="4562169"/>
+            <a:off x="6040670" y="4813247"/>
             <a:ext cx="295526" cy="171685"/>
           </a:xfrm>
           <a:prstGeom prst="triangle">
@@ -4553,8 +4560,8 @@
         </p:nvCxnSpPr>
         <p:spPr>
           <a:xfrm rot="5400000" flipH="1" flipV="1">
-            <a:off x="5363933" y="4478310"/>
-            <a:ext cx="568955" cy="1080045"/>
+            <a:off x="5489472" y="4603849"/>
+            <a:ext cx="317877" cy="1080045"/>
           </a:xfrm>
           <a:prstGeom prst="bentConnector3">
             <a:avLst>
@@ -4594,8 +4601,8 @@
         </p:nvCxnSpPr>
         <p:spPr>
           <a:xfrm rot="16200000" flipV="1">
-            <a:off x="6208884" y="4713403"/>
-            <a:ext cx="567354" cy="608256"/>
+            <a:off x="6334423" y="4838942"/>
+            <a:ext cx="316276" cy="608256"/>
           </a:xfrm>
           <a:prstGeom prst="bentConnector3">
             <a:avLst>
@@ -4939,7 +4946,7 @@
         </p:nvSpPr>
         <p:spPr>
           <a:xfrm>
-            <a:off x="2341650" y="4346784"/>
+            <a:off x="2341650" y="4337906"/>
             <a:ext cx="1146983" cy="272521"/>
           </a:xfrm>
           <a:prstGeom prst="rect">
@@ -4982,6 +4989,211 @@
           </a:p>
         </p:txBody>
       </p:sp>
+      <p:sp>
+        <p:nvSpPr>
+          <p:cNvPr id="52" name="Rectangle 51"/>
+          <p:cNvSpPr/>
+          <p:nvPr/>
+        </p:nvSpPr>
+        <p:spPr>
+          <a:xfrm>
+            <a:off x="1999943" y="5742415"/>
+            <a:ext cx="1576377" cy="540059"/>
+          </a:xfrm>
+          <a:prstGeom prst="rect">
+            <a:avLst/>
+          </a:prstGeom>
+          <a:solidFill>
+            <a:srgbClr val="00B050"/>
+          </a:solidFill>
+          <a:ln>
+            <a:solidFill>
+              <a:schemeClr val="accent3">
+                <a:lumMod val="50000"/>
+              </a:schemeClr>
+            </a:solidFill>
+          </a:ln>
+        </p:spPr>
+        <p:style>
+          <a:lnRef idx="2">
+            <a:schemeClr val="accent1">
+              <a:shade val="50000"/>
+            </a:schemeClr>
+          </a:lnRef>
+          <a:fillRef idx="1">
+            <a:schemeClr val="accent1"/>
+          </a:fillRef>
+          <a:effectRef idx="0">
+            <a:schemeClr val="accent1"/>
+          </a:effectRef>
+          <a:fontRef idx="minor">
+            <a:schemeClr val="lt1"/>
+          </a:fontRef>
+        </p:style>
+        <p:txBody>
+          <a:bodyPr rtlCol="0" anchor="ctr"/>
+          <a:lstStyle/>
+          <a:p>
+            <a:pPr algn="ctr"/>
+            <a:r>
+              <a:rPr lang="en-US" sz="1400" dirty="0" smtClean="0"/>
+              <a:t>&lt;&lt;enumeration&gt;&gt;</a:t>
+            </a:r>
+            <a:r>
+              <a:rPr lang="en-US" sz="1400" dirty="0" smtClean="0"/>
+              <a:t/>
+            </a:r>
+            <a:br>
+              <a:rPr lang="en-US" sz="1400" dirty="0" smtClean="0"/>
+            </a:br>
+            <a:r>
+              <a:rPr lang="en-US" sz="1400" dirty="0" smtClean="0"/>
+              <a:t>Urgency</a:t>
+            </a:r>
+            <a:endParaRPr lang="en-SG" sz="1400" dirty="0"/>
+          </a:p>
+        </p:txBody>
+      </p:sp>
+      <p:sp>
+        <p:nvSpPr>
+          <p:cNvPr id="55" name="Rectangle 54"/>
+          <p:cNvSpPr/>
+          <p:nvPr/>
+        </p:nvSpPr>
+        <p:spPr>
+          <a:xfrm>
+            <a:off x="1999942" y="6281332"/>
+            <a:ext cx="1576377" cy="344841"/>
+          </a:xfrm>
+          <a:prstGeom prst="rect">
+            <a:avLst/>
+          </a:prstGeom>
+          <a:solidFill>
+            <a:srgbClr val="00B050"/>
+          </a:solidFill>
+          <a:ln>
+            <a:solidFill>
+              <a:schemeClr val="accent3">
+                <a:lumMod val="50000"/>
+              </a:schemeClr>
+            </a:solidFill>
+          </a:ln>
+        </p:spPr>
+        <p:style>
+          <a:lnRef idx="2">
+            <a:schemeClr val="accent1">
+              <a:shade val="50000"/>
+            </a:schemeClr>
+          </a:lnRef>
+          <a:fillRef idx="1">
+            <a:schemeClr val="accent1"/>
+          </a:fillRef>
+          <a:effectRef idx="0">
+            <a:schemeClr val="accent1"/>
+          </a:effectRef>
+          <a:fontRef idx="minor">
+            <a:schemeClr val="lt1"/>
+          </a:fontRef>
+        </p:style>
+        <p:txBody>
+          <a:bodyPr rtlCol="0" anchor="ctr"/>
+          <a:lstStyle/>
+          <a:p>
+            <a:pPr algn="ctr"/>
+            <a:r>
+              <a:rPr lang="en-US" sz="1400" dirty="0" smtClean="0"/>
+              <a:t>HIGH, MED, LOW</a:t>
+            </a:r>
+            <a:endParaRPr lang="en-SG" sz="1400" dirty="0"/>
+          </a:p>
+        </p:txBody>
+      </p:sp>
+      <p:cxnSp>
+        <p:nvCxnSpPr>
+          <p:cNvPr id="56" name="Elbow Connector 55"/>
+          <p:cNvCxnSpPr>
+            <a:stCxn id="4" idx="2"/>
+            <a:endCxn id="52" idx="1"/>
+          </p:cNvCxnSpPr>
+          <p:nvPr/>
+        </p:nvCxnSpPr>
+        <p:spPr>
+          <a:xfrm rot="16200000" flipH="1">
+            <a:off x="1439851" y="5452353"/>
+            <a:ext cx="504974" cy="615209"/>
+          </a:xfrm>
+          <a:prstGeom prst="bentConnector2">
+            <a:avLst/>
+          </a:prstGeom>
+          <a:ln>
+            <a:prstDash val="sysDash"/>
+            <a:headEnd type="none" w="med" len="med"/>
+            <a:tailEnd type="arrow" w="med" len="med"/>
+          </a:ln>
+        </p:spPr>
+        <p:style>
+          <a:lnRef idx="2">
+            <a:schemeClr val="accent3">
+              <a:shade val="50000"/>
+            </a:schemeClr>
+          </a:lnRef>
+          <a:fillRef idx="1">
+            <a:schemeClr val="accent3"/>
+          </a:fillRef>
+          <a:effectRef idx="0">
+            <a:schemeClr val="accent3"/>
+          </a:effectRef>
+          <a:fontRef idx="minor">
+            <a:schemeClr val="lt1"/>
+          </a:fontRef>
+        </p:style>
+      </p:cxnSp>
+      <p:cxnSp>
+        <p:nvCxnSpPr>
+          <p:cNvPr id="58" name="Elbow Connector 57"/>
+          <p:cNvCxnSpPr>
+            <a:endCxn id="52" idx="3"/>
+          </p:cNvCxnSpPr>
+          <p:nvPr/>
+        </p:nvCxnSpPr>
+        <p:spPr>
+          <a:xfrm rot="10800000" flipV="1">
+            <a:off x="3576320" y="6010067"/>
+            <a:ext cx="632392" cy="2377"/>
+          </a:xfrm>
+          <a:prstGeom prst="bentConnector3">
+            <a:avLst>
+              <a:gd name="adj1" fmla="val 50000"/>
+            </a:avLst>
+          </a:prstGeom>
+          <a:ln>
+            <a:solidFill>
+              <a:schemeClr val="accent2">
+                <a:lumMod val="75000"/>
+              </a:schemeClr>
+            </a:solidFill>
+            <a:prstDash val="sysDash"/>
+            <a:headEnd type="none" w="med" len="med"/>
+            <a:tailEnd type="arrow" w="med" len="med"/>
+          </a:ln>
+        </p:spPr>
+        <p:style>
+          <a:lnRef idx="2">
+            <a:schemeClr val="accent3">
+              <a:shade val="50000"/>
+            </a:schemeClr>
+          </a:lnRef>
+          <a:fillRef idx="1">
+            <a:schemeClr val="accent3"/>
+          </a:fillRef>
+          <a:effectRef idx="0">
+            <a:schemeClr val="accent3"/>
+          </a:effectRef>
+          <a:fontRef idx="minor">
+            <a:schemeClr val="lt1"/>
+          </a:fontRef>
+        </p:style>
+      </p:cxnSp>
     </p:spTree>
     <p:extLst>
       <p:ext uri="{BB962C8B-B14F-4D97-AF65-F5344CB8AC3E}">

</xml_diff>